<commit_message>
update notebooks and presentation
</commit_message>
<xml_diff>
--- a/presentation/project2_presentation_individual.pptx
+++ b/presentation/project2_presentation_individual.pptx
@@ -8254,7 +8254,19 @@
             </a:pPr>
             <a:r>
               <a:rPr lang="en-US" dirty="0" smtClean="0"/>
-              <a:t>Using a linear regression model, this project aims to answer the following questions:</a:t>
+              <a:t>Using </a:t>
+            </a:r>
+            <a:r>
+              <a:rPr lang="en-US" smtClean="0"/>
+              <a:t>a </a:t>
+            </a:r>
+            <a:r>
+              <a:rPr lang="en-US" smtClean="0"/>
+              <a:t>regression </a:t>
+            </a:r>
+            <a:r>
+              <a:rPr lang="en-US" dirty="0" smtClean="0"/>
+              <a:t>model, this project aims to answer the following questions:</a:t>
             </a:r>
             <a:endParaRPr lang="en-US" dirty="0"/>
           </a:p>

</xml_diff>